<commit_message>
modified something in PPT2
</commit_message>
<xml_diff>
--- a/300分鐘學GIT2.pptx
+++ b/300分鐘學GIT2.pptx
@@ -150,7 +150,7 @@
   <pc:docChgLst>
     <pc:chgData name="紹軒" userId="fd00c7a7-b1ae-4d95-9516-c404b94a9c73" providerId="ADAL" clId="{26728EF2-6137-488D-B2B1-0A1587C96750}"/>
     <pc:docChg chg="undo redo custSel addSld delSld modSld">
-      <pc:chgData name="紹軒" userId="fd00c7a7-b1ae-4d95-9516-c404b94a9c73" providerId="ADAL" clId="{26728EF2-6137-488D-B2B1-0A1587C96750}" dt="2020-08-05T02:28:54.541" v="3181" actId="20577"/>
+      <pc:chgData name="紹軒" userId="fd00c7a7-b1ae-4d95-9516-c404b94a9c73" providerId="ADAL" clId="{26728EF2-6137-488D-B2B1-0A1587C96750}" dt="2020-08-05T03:25:50.890" v="3294" actId="20577"/>
       <pc:docMkLst>
         <pc:docMk/>
       </pc:docMkLst>
@@ -833,7 +833,7 @@
         </pc:spChg>
       </pc:sldChg>
       <pc:sldChg chg="addSp delSp modSp add mod">
-        <pc:chgData name="紹軒" userId="fd00c7a7-b1ae-4d95-9516-c404b94a9c73" providerId="ADAL" clId="{26728EF2-6137-488D-B2B1-0A1587C96750}" dt="2020-08-04T10:44:41.550" v="1736"/>
+        <pc:chgData name="紹軒" userId="fd00c7a7-b1ae-4d95-9516-c404b94a9c73" providerId="ADAL" clId="{26728EF2-6137-488D-B2B1-0A1587C96750}" dt="2020-08-05T03:25:50.890" v="3294" actId="20577"/>
         <pc:sldMkLst>
           <pc:docMk/>
           <pc:sldMk cId="2739104880" sldId="286"/>
@@ -847,7 +847,7 @@
           </ac:spMkLst>
         </pc:spChg>
         <pc:spChg chg="mod">
-          <ac:chgData name="紹軒" userId="fd00c7a7-b1ae-4d95-9516-c404b94a9c73" providerId="ADAL" clId="{26728EF2-6137-488D-B2B1-0A1587C96750}" dt="2020-08-04T10:27:47.788" v="1505" actId="20577"/>
+          <ac:chgData name="紹軒" userId="fd00c7a7-b1ae-4d95-9516-c404b94a9c73" providerId="ADAL" clId="{26728EF2-6137-488D-B2B1-0A1587C96750}" dt="2020-08-05T03:25:50.890" v="3294" actId="20577"/>
           <ac:spMkLst>
             <pc:docMk/>
             <pc:sldMk cId="2739104880" sldId="286"/>
@@ -1431,7 +1431,7 @@
         </pc:picChg>
       </pc:sldChg>
       <pc:sldChg chg="modSp new mod">
-        <pc:chgData name="紹軒" userId="fd00c7a7-b1ae-4d95-9516-c404b94a9c73" providerId="ADAL" clId="{26728EF2-6137-488D-B2B1-0A1587C96750}" dt="2020-08-05T02:25:47.621" v="2850" actId="20577"/>
+        <pc:chgData name="紹軒" userId="fd00c7a7-b1ae-4d95-9516-c404b94a9c73" providerId="ADAL" clId="{26728EF2-6137-488D-B2B1-0A1587C96750}" dt="2020-08-05T02:32:50.062" v="3254" actId="20577"/>
         <pc:sldMkLst>
           <pc:docMk/>
           <pc:sldMk cId="1365124306" sldId="296"/>
@@ -1445,7 +1445,7 @@
           </ac:spMkLst>
         </pc:spChg>
         <pc:spChg chg="mod">
-          <ac:chgData name="紹軒" userId="fd00c7a7-b1ae-4d95-9516-c404b94a9c73" providerId="ADAL" clId="{26728EF2-6137-488D-B2B1-0A1587C96750}" dt="2020-08-05T02:25:47.621" v="2850" actId="20577"/>
+          <ac:chgData name="紹軒" userId="fd00c7a7-b1ae-4d95-9516-c404b94a9c73" providerId="ADAL" clId="{26728EF2-6137-488D-B2B1-0A1587C96750}" dt="2020-08-05T02:32:50.062" v="3254" actId="20577"/>
           <ac:spMkLst>
             <pc:docMk/>
             <pc:sldMk cId="1365124306" sldId="296"/>
@@ -14297,6 +14297,40 @@
             <a:r>
               <a:rPr lang="zh-TW" altLang="en-US" dirty="0"/>
               <a:t>請問他們該如何協作呢</a:t>
+            </a:r>
+            <a:r>
+              <a:rPr lang="en-US" altLang="zh-TW" dirty="0"/>
+              <a:t>?</a:t>
+            </a:r>
+          </a:p>
+          <a:p>
+            <a:r>
+              <a:rPr lang="zh-TW" altLang="en-US" dirty="0"/>
+              <a:t>承上題</a:t>
+            </a:r>
+            <a:r>
+              <a:rPr lang="en-US" altLang="zh-TW" dirty="0"/>
+              <a:t>,</a:t>
+            </a:r>
+            <a:r>
+              <a:rPr lang="zh-TW" altLang="en-US" dirty="0"/>
+              <a:t> 他們後來又想用 </a:t>
+            </a:r>
+            <a:r>
+              <a:rPr lang="en-US" altLang="zh-TW" dirty="0" err="1"/>
+              <a:t>Github</a:t>
+            </a:r>
+            <a:r>
+              <a:rPr lang="zh-TW" altLang="en-US" dirty="0"/>
+              <a:t> 管理專案了</a:t>
+            </a:r>
+            <a:r>
+              <a:rPr lang="en-US" altLang="zh-TW" dirty="0"/>
+              <a:t>, </a:t>
+            </a:r>
+            <a:r>
+              <a:rPr lang="zh-TW" altLang="en-US" dirty="0"/>
+              <a:t>那麼該怎麼做呢</a:t>
             </a:r>
             <a:r>
               <a:rPr lang="en-US" altLang="zh-TW" dirty="0"/>
@@ -20959,23 +20993,7 @@
                   <a:prstClr val="black"/>
                 </a:solidFill>
               </a:rPr>
-              <a:t>[</a:t>
-            </a:r>
-            <a:r>
-              <a:rPr lang="zh-TW" altLang="en-US" sz="2000" b="1" dirty="0">
-                <a:solidFill>
-                  <a:prstClr val="black"/>
-                </a:solidFill>
-              </a:rPr>
-              <a:t>上游</a:t>
-            </a:r>
-            <a:r>
-              <a:rPr lang="en-US" altLang="zh-TW" sz="2000" b="1" dirty="0">
-                <a:solidFill>
-                  <a:prstClr val="black"/>
-                </a:solidFill>
-              </a:rPr>
-              <a:t>] [</a:t>
+              <a:t>[origin/master] [</a:t>
             </a:r>
             <a:r>
               <a:rPr lang="en-US" altLang="zh-TW" sz="2000" b="1" dirty="0" err="1">
@@ -23094,18 +23112,18 @@
 </file>
 
 <file path=customXml/item1.xml><?xml version="1.0" encoding="utf-8"?>
-<p:properties xmlns:p="http://schemas.microsoft.com/office/2006/metadata/properties" xmlns:xsi="http://www.w3.org/2001/XMLSchema-instance" xmlns:pc="http://schemas.microsoft.com/office/infopath/2007/PartnerControls">
-  <documentManagement/>
-</p:properties>
-</file>
-
-<file path=customXml/item2.xml><?xml version="1.0" encoding="utf-8"?>
 <?mso-contentType ?>
 <FormTemplates xmlns="http://schemas.microsoft.com/sharepoint/v3/contenttype/forms">
   <Display>DocumentLibraryForm</Display>
   <Edit>DocumentLibraryForm</Edit>
   <New>DocumentLibraryForm</New>
 </FormTemplates>
+</file>
+
+<file path=customXml/item2.xml><?xml version="1.0" encoding="utf-8"?>
+<p:properties xmlns:p="http://schemas.microsoft.com/office/2006/metadata/properties" xmlns:xsi="http://www.w3.org/2001/XMLSchema-instance" xmlns:pc="http://schemas.microsoft.com/office/infopath/2007/PartnerControls">
+  <documentManagement/>
+</p:properties>
 </file>
 
 <file path=customXml/item3.xml><?xml version="1.0" encoding="utf-8"?>
@@ -23293,18 +23311,18 @@
 </file>
 
 <file path=customXml/itemProps1.xml><?xml version="1.0" encoding="utf-8"?>
-<ds:datastoreItem xmlns:ds="http://schemas.openxmlformats.org/officeDocument/2006/customXml" ds:itemID="{B2C6CD7B-F309-43EE-8B7C-ABB9D1E2BC00}">
+<ds:datastoreItem xmlns:ds="http://schemas.openxmlformats.org/officeDocument/2006/customXml" ds:itemID="{4F1F8323-2FDF-4DFD-868A-5A2F1BD87409}">
   <ds:schemaRefs>
-    <ds:schemaRef ds:uri="http://schemas.microsoft.com/office/2006/metadata/properties"/>
-    <ds:schemaRef ds:uri="http://schemas.microsoft.com/office/infopath/2007/PartnerControls"/>
+    <ds:schemaRef ds:uri="http://schemas.microsoft.com/sharepoint/v3/contenttype/forms"/>
   </ds:schemaRefs>
 </ds:datastoreItem>
 </file>
 
 <file path=customXml/itemProps2.xml><?xml version="1.0" encoding="utf-8"?>
-<ds:datastoreItem xmlns:ds="http://schemas.openxmlformats.org/officeDocument/2006/customXml" ds:itemID="{4F1F8323-2FDF-4DFD-868A-5A2F1BD87409}">
+<ds:datastoreItem xmlns:ds="http://schemas.openxmlformats.org/officeDocument/2006/customXml" ds:itemID="{B2C6CD7B-F309-43EE-8B7C-ABB9D1E2BC00}">
   <ds:schemaRefs>
-    <ds:schemaRef ds:uri="http://schemas.microsoft.com/sharepoint/v3/contenttype/forms"/>
+    <ds:schemaRef ds:uri="http://schemas.microsoft.com/office/2006/metadata/properties"/>
+    <ds:schemaRef ds:uri="http://schemas.microsoft.com/office/infopath/2007/PartnerControls"/>
   </ds:schemaRefs>
 </ds:datastoreItem>
 </file>

</xml_diff>